<commit_message>
new change time delay
</commit_message>
<xml_diff>
--- a/MAZE GENERATOR.pptx
+++ b/MAZE GENERATOR.pptx
@@ -7,9 +7,10 @@
   <p:sldIdLst>
     <p:sldId id="256" r:id="rId2"/>
     <p:sldId id="257" r:id="rId3"/>
-    <p:sldId id="258" r:id="rId4"/>
-    <p:sldId id="259" r:id="rId5"/>
-    <p:sldId id="260" r:id="rId6"/>
+    <p:sldId id="261" r:id="rId4"/>
+    <p:sldId id="258" r:id="rId5"/>
+    <p:sldId id="259" r:id="rId6"/>
+    <p:sldId id="260" r:id="rId7"/>
   </p:sldIdLst>
   <p:sldSz cx="12192000" cy="6858000"/>
   <p:notesSz cx="6858000" cy="9144000"/>
@@ -108,6 +109,11 @@
       </a:defRPr>
     </a:lvl9pPr>
   </p:defaultTextStyle>
+  <p:extLst>
+    <p:ext uri="{EFAFB233-063F-42B5-8137-9DF3F51BA10A}">
+      <p15:sldGuideLst xmlns:p15="http://schemas.microsoft.com/office/powerpoint/2012/main"/>
+    </p:ext>
+  </p:extLst>
 </p:presentation>
 </file>
 
@@ -242,7 +248,7 @@
           <a:p>
             <a:fld id="{ACEADBC7-A235-44E6-96F4-83ED68D16883}" type="datetimeFigureOut">
               <a:rPr lang="en-US" smtClean="0"/>
-              <a:t>12/1/2024</a:t>
+              <a:t>12/7/2024</a:t>
             </a:fld>
             <a:endParaRPr lang="en-US"/>
           </a:p>
@@ -412,7 +418,7 @@
           <a:p>
             <a:fld id="{ACEADBC7-A235-44E6-96F4-83ED68D16883}" type="datetimeFigureOut">
               <a:rPr lang="en-US" smtClean="0"/>
-              <a:t>12/1/2024</a:t>
+              <a:t>12/7/2024</a:t>
             </a:fld>
             <a:endParaRPr lang="en-US"/>
           </a:p>
@@ -592,7 +598,7 @@
           <a:p>
             <a:fld id="{ACEADBC7-A235-44E6-96F4-83ED68D16883}" type="datetimeFigureOut">
               <a:rPr lang="en-US" smtClean="0"/>
-              <a:t>12/1/2024</a:t>
+              <a:t>12/7/2024</a:t>
             </a:fld>
             <a:endParaRPr lang="en-US"/>
           </a:p>
@@ -762,7 +768,7 @@
           <a:p>
             <a:fld id="{ACEADBC7-A235-44E6-96F4-83ED68D16883}" type="datetimeFigureOut">
               <a:rPr lang="en-US" smtClean="0"/>
-              <a:t>12/1/2024</a:t>
+              <a:t>12/7/2024</a:t>
             </a:fld>
             <a:endParaRPr lang="en-US"/>
           </a:p>
@@ -1008,7 +1014,7 @@
           <a:p>
             <a:fld id="{ACEADBC7-A235-44E6-96F4-83ED68D16883}" type="datetimeFigureOut">
               <a:rPr lang="en-US" smtClean="0"/>
-              <a:t>12/1/2024</a:t>
+              <a:t>12/7/2024</a:t>
             </a:fld>
             <a:endParaRPr lang="en-US"/>
           </a:p>
@@ -1240,7 +1246,7 @@
           <a:p>
             <a:fld id="{ACEADBC7-A235-44E6-96F4-83ED68D16883}" type="datetimeFigureOut">
               <a:rPr lang="en-US" smtClean="0"/>
-              <a:t>12/1/2024</a:t>
+              <a:t>12/7/2024</a:t>
             </a:fld>
             <a:endParaRPr lang="en-US"/>
           </a:p>
@@ -1607,7 +1613,7 @@
           <a:p>
             <a:fld id="{ACEADBC7-A235-44E6-96F4-83ED68D16883}" type="datetimeFigureOut">
               <a:rPr lang="en-US" smtClean="0"/>
-              <a:t>12/1/2024</a:t>
+              <a:t>12/7/2024</a:t>
             </a:fld>
             <a:endParaRPr lang="en-US"/>
           </a:p>
@@ -1725,7 +1731,7 @@
           <a:p>
             <a:fld id="{ACEADBC7-A235-44E6-96F4-83ED68D16883}" type="datetimeFigureOut">
               <a:rPr lang="en-US" smtClean="0"/>
-              <a:t>12/1/2024</a:t>
+              <a:t>12/7/2024</a:t>
             </a:fld>
             <a:endParaRPr lang="en-US"/>
           </a:p>
@@ -1820,7 +1826,7 @@
           <a:p>
             <a:fld id="{ACEADBC7-A235-44E6-96F4-83ED68D16883}" type="datetimeFigureOut">
               <a:rPr lang="en-US" smtClean="0"/>
-              <a:t>12/1/2024</a:t>
+              <a:t>12/7/2024</a:t>
             </a:fld>
             <a:endParaRPr lang="en-US"/>
           </a:p>
@@ -2097,7 +2103,7 @@
           <a:p>
             <a:fld id="{ACEADBC7-A235-44E6-96F4-83ED68D16883}" type="datetimeFigureOut">
               <a:rPr lang="en-US" smtClean="0"/>
-              <a:t>12/1/2024</a:t>
+              <a:t>12/7/2024</a:t>
             </a:fld>
             <a:endParaRPr lang="en-US"/>
           </a:p>
@@ -2354,7 +2360,7 @@
           <a:p>
             <a:fld id="{ACEADBC7-A235-44E6-96F4-83ED68D16883}" type="datetimeFigureOut">
               <a:rPr lang="en-US" smtClean="0"/>
-              <a:t>12/1/2024</a:t>
+              <a:t>12/7/2024</a:t>
             </a:fld>
             <a:endParaRPr lang="en-US"/>
           </a:p>
@@ -2567,7 +2573,7 @@
           <a:p>
             <a:fld id="{ACEADBC7-A235-44E6-96F4-83ED68D16883}" type="datetimeFigureOut">
               <a:rPr lang="en-US" smtClean="0"/>
-              <a:t>12/1/2024</a:t>
+              <a:t>12/7/2024</a:t>
             </a:fld>
             <a:endParaRPr lang="en-US"/>
           </a:p>
@@ -5024,7 +5030,7 @@
         </p:nvSpPr>
         <p:spPr>
           <a:xfrm>
-            <a:off x="5956784" y="396117"/>
+            <a:off x="6974828" y="171665"/>
             <a:ext cx="5217172" cy="1158857"/>
           </a:xfrm>
         </p:spPr>
@@ -5035,7 +5041,7 @@
           <a:lstStyle/>
           <a:p>
             <a:r>
-              <a:rPr lang="en-US">
+              <a:rPr lang="en-US" dirty="0">
                 <a:solidFill>
                   <a:schemeClr val="bg1"/>
                 </a:solidFill>
@@ -5620,35 +5626,6 @@
           </a:p>
         </p:txBody>
       </p:sp>
-      <p:pic>
-        <p:nvPicPr>
-          <p:cNvPr id="5" name="Picture 4" descr="Maze">
-            <a:extLst>
-              <a:ext uri="{FF2B5EF4-FFF2-40B4-BE49-F238E27FC236}">
-                <a16:creationId xmlns:a16="http://schemas.microsoft.com/office/drawing/2014/main" id="{F8EA4748-A307-5644-D621-C48E0FF2FD92}"/>
-              </a:ext>
-            </a:extLst>
-          </p:cNvPr>
-          <p:cNvPicPr>
-            <a:picLocks noChangeAspect="1"/>
-          </p:cNvPicPr>
-          <p:nvPr/>
-        </p:nvPicPr>
-        <p:blipFill>
-          <a:blip r:embed="rId2"/>
-          <a:srcRect l="10061" r="16183" b="1"/>
-          <a:stretch/>
-        </p:blipFill>
-        <p:spPr>
-          <a:xfrm>
-            <a:off x="1526293" y="1554974"/>
-            <a:ext cx="3555043" cy="3217333"/>
-          </a:xfrm>
-          <a:prstGeom prst="rect">
-            <a:avLst/>
-          </a:prstGeom>
-        </p:spPr>
-      </p:pic>
       <p:grpSp>
         <p:nvGrpSpPr>
           <p:cNvPr id="26" name="Graphic 4">
@@ -6921,8 +6898,8 @@
         </p:nvSpPr>
         <p:spPr>
           <a:xfrm>
-            <a:off x="5956783" y="1747592"/>
-            <a:ext cx="5217173" cy="4351338"/>
+            <a:off x="6810586" y="1755568"/>
+            <a:ext cx="5217171" cy="4351338"/>
           </a:xfrm>
         </p:spPr>
         <p:txBody>
@@ -6932,7 +6909,7 @@
           <a:lstStyle/>
           <a:p>
             <a:r>
-              <a:rPr lang="en-US">
+              <a:rPr lang="en-US" dirty="0">
                 <a:solidFill>
                   <a:schemeClr val="bg1"/>
                 </a:solidFill>
@@ -6942,7 +6919,7 @@
           </a:p>
           <a:p>
             <a:r>
-              <a:rPr lang="en-US">
+              <a:rPr lang="en-US" dirty="0">
                 <a:solidFill>
                   <a:schemeClr val="bg1"/>
                 </a:solidFill>
@@ -6952,7 +6929,7 @@
           </a:p>
           <a:p>
             <a:r>
-              <a:rPr lang="en-US">
+              <a:rPr lang="en-US" dirty="0">
                 <a:solidFill>
                   <a:schemeClr val="bg1"/>
                 </a:solidFill>
@@ -6962,7 +6939,7 @@
           </a:p>
           <a:p>
             <a:r>
-              <a:rPr lang="en-US">
+              <a:rPr lang="en-US" dirty="0">
                 <a:solidFill>
                   <a:schemeClr val="bg1"/>
                 </a:solidFill>
@@ -6972,7 +6949,7 @@
           </a:p>
           <a:p>
             <a:r>
-              <a:rPr lang="en-US">
+              <a:rPr lang="en-US" dirty="0">
                 <a:solidFill>
                   <a:schemeClr val="bg1"/>
                 </a:solidFill>
@@ -6982,6 +6959,36 @@
           </a:p>
         </p:txBody>
       </p:sp>
+      <p:pic>
+        <p:nvPicPr>
+          <p:cNvPr id="6" name="Picture 5">
+            <a:extLst>
+              <a:ext uri="{FF2B5EF4-FFF2-40B4-BE49-F238E27FC236}">
+                <a16:creationId xmlns:a16="http://schemas.microsoft.com/office/drawing/2014/main" id="{B53FBAC5-1D86-A44E-E8A4-C8FBC49A1416}"/>
+              </a:ext>
+            </a:extLst>
+          </p:cNvPr>
+          <p:cNvPicPr>
+            <a:picLocks noChangeAspect="1"/>
+          </p:cNvPicPr>
+          <p:nvPr/>
+        </p:nvPicPr>
+        <p:blipFill>
+          <a:blip r:embed="rId2"/>
+          <a:stretch>
+            <a:fillRect/>
+          </a:stretch>
+        </p:blipFill>
+        <p:spPr>
+          <a:xfrm>
+            <a:off x="163190" y="151033"/>
+            <a:ext cx="6486764" cy="6474491"/>
+          </a:xfrm>
+          <a:prstGeom prst="rect">
+            <a:avLst/>
+          </a:prstGeom>
+        </p:spPr>
+      </p:pic>
     </p:spTree>
     <p:extLst>
       <p:ext uri="{BB962C8B-B14F-4D97-AF65-F5344CB8AC3E}">
@@ -6996,6 +7003,413 @@
 </file>
 
 <file path=ppt/slides/slide3.xml><?xml version="1.0" encoding="utf-8"?>
+<p:sld xmlns:a="http://schemas.openxmlformats.org/drawingml/2006/main" xmlns:r="http://schemas.openxmlformats.org/officeDocument/2006/relationships" xmlns:p="http://schemas.openxmlformats.org/presentationml/2006/main">
+  <p:cSld>
+    <p:bg>
+      <p:bgPr>
+        <a:solidFill>
+          <a:schemeClr val="bg1"/>
+        </a:solidFill>
+        <a:effectLst/>
+      </p:bgPr>
+    </p:bg>
+    <p:spTree>
+      <p:nvGrpSpPr>
+        <p:cNvPr id="1" name=""/>
+        <p:cNvGrpSpPr/>
+        <p:nvPr/>
+      </p:nvGrpSpPr>
+      <p:grpSpPr>
+        <a:xfrm>
+          <a:off x="0" y="0"/>
+          <a:ext cx="0" cy="0"/>
+          <a:chOff x="0" y="0"/>
+          <a:chExt cx="0" cy="0"/>
+        </a:xfrm>
+      </p:grpSpPr>
+      <p:sp>
+        <p:nvSpPr>
+          <p:cNvPr id="12" name="Rectangle 11">
+            <a:extLst>
+              <a:ext uri="{FF2B5EF4-FFF2-40B4-BE49-F238E27FC236}">
+                <a16:creationId xmlns:a16="http://schemas.microsoft.com/office/drawing/2014/main" id="{E8A8EAB8-D2FF-444D-B34B-7D32F106AD0E}"/>
+              </a:ext>
+              <a:ext uri="{C183D7F6-B498-43B3-948B-1728B52AA6E4}">
+                <adec:decorative xmlns:adec="http://schemas.microsoft.com/office/drawing/2017/decorative" val="1"/>
+              </a:ext>
+            </a:extLst>
+          </p:cNvPr>
+          <p:cNvSpPr>
+            <a:spLocks noGrp="1" noRot="1" noChangeAspect="1" noMove="1" noResize="1" noEditPoints="1" noAdjustHandles="1" noChangeArrowheads="1" noChangeShapeType="1" noTextEdit="1"/>
+          </p:cNvSpPr>
+          <p:nvPr>
+            <p:extLst>
+              <p:ext uri="{386F3935-93C4-4BCD-93E2-E3B085C9AB24}">
+                <p16:designElem xmlns:p16="http://schemas.microsoft.com/office/powerpoint/2015/main" val="1"/>
+              </p:ext>
+            </p:extLst>
+          </p:nvPr>
+        </p:nvSpPr>
+        <p:spPr>
+          <a:xfrm>
+            <a:off x="0" y="0"/>
+            <a:ext cx="12192000" cy="6858000"/>
+          </a:xfrm>
+          <a:prstGeom prst="rect">
+            <a:avLst/>
+          </a:prstGeom>
+          <a:solidFill>
+            <a:schemeClr val="tx1">
+              <a:lumMod val="95000"/>
+              <a:lumOff val="5000"/>
+            </a:schemeClr>
+          </a:solidFill>
+          <a:ln>
+            <a:noFill/>
+          </a:ln>
+        </p:spPr>
+        <p:style>
+          <a:lnRef idx="2">
+            <a:schemeClr val="accent1">
+              <a:shade val="50000"/>
+            </a:schemeClr>
+          </a:lnRef>
+          <a:fillRef idx="1">
+            <a:schemeClr val="accent1"/>
+          </a:fillRef>
+          <a:effectRef idx="0">
+            <a:schemeClr val="accent1"/>
+          </a:effectRef>
+          <a:fontRef idx="minor">
+            <a:schemeClr val="lt1"/>
+          </a:fontRef>
+        </p:style>
+        <p:txBody>
+          <a:bodyPr rtlCol="0" anchor="ctr"/>
+          <a:lstStyle/>
+          <a:p>
+            <a:pPr algn="ctr"/>
+            <a:endParaRPr lang="en-US" dirty="0">
+              <a:solidFill>
+                <a:schemeClr val="bg1"/>
+              </a:solidFill>
+            </a:endParaRPr>
+          </a:p>
+        </p:txBody>
+      </p:sp>
+      <p:sp>
+        <p:nvSpPr>
+          <p:cNvPr id="2" name="Title 1">
+            <a:extLst>
+              <a:ext uri="{FF2B5EF4-FFF2-40B4-BE49-F238E27FC236}">
+                <a16:creationId xmlns:a16="http://schemas.microsoft.com/office/drawing/2014/main" id="{F9B8E46B-F6F2-F3D2-2318-4C6A840D8D0C}"/>
+              </a:ext>
+            </a:extLst>
+          </p:cNvPr>
+          <p:cNvSpPr>
+            <a:spLocks noGrp="1"/>
+          </p:cNvSpPr>
+          <p:nvPr>
+            <p:ph type="title"/>
+          </p:nvPr>
+        </p:nvSpPr>
+        <p:spPr>
+          <a:xfrm>
+            <a:off x="652848" y="97626"/>
+            <a:ext cx="4707671" cy="701606"/>
+          </a:xfrm>
+        </p:spPr>
+        <p:txBody>
+          <a:bodyPr anchor="b">
+            <a:normAutofit/>
+          </a:bodyPr>
+          <a:lstStyle/>
+          <a:p>
+            <a:r>
+              <a:rPr lang="en-US" sz="3800" dirty="0">
+                <a:solidFill>
+                  <a:schemeClr val="bg1"/>
+                </a:solidFill>
+              </a:rPr>
+              <a:t>Breadth First Search</a:t>
+            </a:r>
+          </a:p>
+        </p:txBody>
+      </p:sp>
+      <p:cxnSp>
+        <p:nvCxnSpPr>
+          <p:cNvPr id="14" name="Straight Connector 13">
+            <a:extLst>
+              <a:ext uri="{FF2B5EF4-FFF2-40B4-BE49-F238E27FC236}">
+                <a16:creationId xmlns:a16="http://schemas.microsoft.com/office/drawing/2014/main" id="{EEA38897-7BA3-4408-8083-3235339C4A60}"/>
+              </a:ext>
+              <a:ext uri="{C183D7F6-B498-43B3-948B-1728B52AA6E4}">
+                <adec:decorative xmlns:adec="http://schemas.microsoft.com/office/drawing/2017/decorative" val="1"/>
+              </a:ext>
+            </a:extLst>
+          </p:cNvPr>
+          <p:cNvCxnSpPr>
+            <a:cxnSpLocks noGrp="1" noRot="1" noChangeAspect="1" noMove="1" noResize="1" noEditPoints="1" noAdjustHandles="1" noChangeArrowheads="1" noChangeShapeType="1"/>
+          </p:cNvCxnSpPr>
+          <p:nvPr>
+            <p:extLst>
+              <p:ext uri="{386F3935-93C4-4BCD-93E2-E3B085C9AB24}">
+                <p16:designElem xmlns:p16="http://schemas.microsoft.com/office/powerpoint/2015/main" val="1"/>
+              </p:ext>
+            </p:extLst>
+          </p:nvPr>
+        </p:nvCxnSpPr>
+        <p:spPr>
+          <a:xfrm flipH="1">
+            <a:off x="831873" y="1749756"/>
+            <a:ext cx="4718304" cy="0"/>
+          </a:xfrm>
+          <a:prstGeom prst="line">
+            <a:avLst/>
+          </a:prstGeom>
+          <a:ln w="12700">
+            <a:solidFill>
+              <a:schemeClr val="accent2"/>
+            </a:solidFill>
+          </a:ln>
+        </p:spPr>
+        <p:style>
+          <a:lnRef idx="1">
+            <a:schemeClr val="accent1"/>
+          </a:lnRef>
+          <a:fillRef idx="0">
+            <a:schemeClr val="accent1"/>
+          </a:fillRef>
+          <a:effectRef idx="0">
+            <a:schemeClr val="accent1"/>
+          </a:effectRef>
+          <a:fontRef idx="minor">
+            <a:schemeClr val="tx1"/>
+          </a:fontRef>
+        </p:style>
+      </p:cxnSp>
+      <p:cxnSp>
+        <p:nvCxnSpPr>
+          <p:cNvPr id="16" name="Straight Connector 15">
+            <a:extLst>
+              <a:ext uri="{FF2B5EF4-FFF2-40B4-BE49-F238E27FC236}">
+                <a16:creationId xmlns:a16="http://schemas.microsoft.com/office/drawing/2014/main" id="{F11AD06B-AB20-4097-8606-5DA00DBACE88}"/>
+              </a:ext>
+              <a:ext uri="{C183D7F6-B498-43B3-948B-1728B52AA6E4}">
+                <adec:decorative xmlns:adec="http://schemas.microsoft.com/office/drawing/2017/decorative" val="1"/>
+              </a:ext>
+            </a:extLst>
+          </p:cNvPr>
+          <p:cNvCxnSpPr>
+            <a:cxnSpLocks noGrp="1" noRot="1" noChangeAspect="1" noMove="1" noResize="1" noEditPoints="1" noAdjustHandles="1" noChangeArrowheads="1" noChangeShapeType="1"/>
+          </p:cNvCxnSpPr>
+          <p:nvPr>
+            <p:extLst>
+              <p:ext uri="{386F3935-93C4-4BCD-93E2-E3B085C9AB24}">
+                <p16:designElem xmlns:p16="http://schemas.microsoft.com/office/powerpoint/2015/main" val="1"/>
+              </p:ext>
+            </p:extLst>
+          </p:nvPr>
+        </p:nvCxnSpPr>
+        <p:spPr>
+          <a:xfrm flipH="1">
+            <a:off x="834027" y="5707672"/>
+            <a:ext cx="4713997" cy="0"/>
+          </a:xfrm>
+          <a:prstGeom prst="line">
+            <a:avLst/>
+          </a:prstGeom>
+          <a:ln w="12700">
+            <a:solidFill>
+              <a:schemeClr val="accent2"/>
+            </a:solidFill>
+          </a:ln>
+        </p:spPr>
+        <p:style>
+          <a:lnRef idx="1">
+            <a:schemeClr val="accent1"/>
+          </a:lnRef>
+          <a:fillRef idx="0">
+            <a:schemeClr val="accent1"/>
+          </a:fillRef>
+          <a:effectRef idx="0">
+            <a:schemeClr val="accent1"/>
+          </a:effectRef>
+          <a:fontRef idx="minor">
+            <a:schemeClr val="tx1"/>
+          </a:fontRef>
+        </p:style>
+      </p:cxnSp>
+      <p:pic>
+        <p:nvPicPr>
+          <p:cNvPr id="5" name="Content Placeholder 4">
+            <a:extLst>
+              <a:ext uri="{FF2B5EF4-FFF2-40B4-BE49-F238E27FC236}">
+                <a16:creationId xmlns:a16="http://schemas.microsoft.com/office/drawing/2014/main" id="{449A0EE4-50CE-46A5-6190-CD5A3E1FB164}"/>
+              </a:ext>
+            </a:extLst>
+          </p:cNvPr>
+          <p:cNvPicPr>
+            <a:picLocks noChangeAspect="1"/>
+          </p:cNvPicPr>
+          <p:nvPr/>
+        </p:nvPicPr>
+        <p:blipFill>
+          <a:blip r:embed="rId2"/>
+          <a:stretch>
+            <a:fillRect/>
+          </a:stretch>
+        </p:blipFill>
+        <p:spPr>
+          <a:xfrm>
+            <a:off x="6306114" y="895338"/>
+            <a:ext cx="5885886" cy="5488588"/>
+          </a:xfrm>
+          <a:prstGeom prst="rect">
+            <a:avLst/>
+          </a:prstGeom>
+        </p:spPr>
+      </p:pic>
+      <p:pic>
+        <p:nvPicPr>
+          <p:cNvPr id="6" name="Picture 5">
+            <a:extLst>
+              <a:ext uri="{FF2B5EF4-FFF2-40B4-BE49-F238E27FC236}">
+                <a16:creationId xmlns:a16="http://schemas.microsoft.com/office/drawing/2014/main" id="{50A648EF-D9B8-6D82-B1CC-25F343A1B591}"/>
+              </a:ext>
+            </a:extLst>
+          </p:cNvPr>
+          <p:cNvPicPr>
+            <a:picLocks noChangeAspect="1"/>
+          </p:cNvPicPr>
+          <p:nvPr/>
+        </p:nvPicPr>
+        <p:blipFill>
+          <a:blip r:embed="rId3"/>
+          <a:stretch>
+            <a:fillRect/>
+          </a:stretch>
+        </p:blipFill>
+        <p:spPr>
+          <a:xfrm>
+            <a:off x="127684" y="895338"/>
+            <a:ext cx="5498992" cy="5488588"/>
+          </a:xfrm>
+          <a:prstGeom prst="rect">
+            <a:avLst/>
+          </a:prstGeom>
+        </p:spPr>
+      </p:pic>
+      <p:cxnSp>
+        <p:nvCxnSpPr>
+          <p:cNvPr id="8" name="Straight Arrow Connector 7">
+            <a:extLst>
+              <a:ext uri="{FF2B5EF4-FFF2-40B4-BE49-F238E27FC236}">
+                <a16:creationId xmlns:a16="http://schemas.microsoft.com/office/drawing/2014/main" id="{B459F27A-B275-1C50-4114-4A6BDEF28062}"/>
+              </a:ext>
+            </a:extLst>
+          </p:cNvPr>
+          <p:cNvCxnSpPr>
+            <a:cxnSpLocks/>
+          </p:cNvCxnSpPr>
+          <p:nvPr/>
+        </p:nvCxnSpPr>
+        <p:spPr>
+          <a:xfrm>
+            <a:off x="5682423" y="3210304"/>
+            <a:ext cx="623691" cy="0"/>
+          </a:xfrm>
+          <a:prstGeom prst="straightConnector1">
+            <a:avLst/>
+          </a:prstGeom>
+          <a:ln w="76200">
+            <a:solidFill>
+              <a:schemeClr val="bg1"/>
+            </a:solidFill>
+            <a:tailEnd type="triangle"/>
+          </a:ln>
+        </p:spPr>
+        <p:style>
+          <a:lnRef idx="2">
+            <a:schemeClr val="accent1"/>
+          </a:lnRef>
+          <a:fillRef idx="0">
+            <a:schemeClr val="accent1"/>
+          </a:fillRef>
+          <a:effectRef idx="1">
+            <a:schemeClr val="accent1"/>
+          </a:effectRef>
+          <a:fontRef idx="minor">
+            <a:schemeClr val="tx1"/>
+          </a:fontRef>
+        </p:style>
+      </p:cxnSp>
+      <p:sp>
+        <p:nvSpPr>
+          <p:cNvPr id="11" name="Oval 10">
+            <a:extLst>
+              <a:ext uri="{FF2B5EF4-FFF2-40B4-BE49-F238E27FC236}">
+                <a16:creationId xmlns:a16="http://schemas.microsoft.com/office/drawing/2014/main" id="{F06B3C5A-2486-B397-C94E-C1F0B325ECCA}"/>
+              </a:ext>
+            </a:extLst>
+          </p:cNvPr>
+          <p:cNvSpPr/>
+          <p:nvPr/>
+        </p:nvSpPr>
+        <p:spPr>
+          <a:xfrm>
+            <a:off x="7519086" y="5035378"/>
+            <a:ext cx="1118287" cy="308919"/>
+          </a:xfrm>
+          <a:prstGeom prst="ellipse">
+            <a:avLst/>
+          </a:prstGeom>
+          <a:noFill/>
+          <a:ln>
+            <a:solidFill>
+              <a:srgbClr val="FF0000"/>
+            </a:solidFill>
+          </a:ln>
+        </p:spPr>
+        <p:style>
+          <a:lnRef idx="2">
+            <a:schemeClr val="accent1">
+              <a:shade val="15000"/>
+            </a:schemeClr>
+          </a:lnRef>
+          <a:fillRef idx="1">
+            <a:schemeClr val="accent1"/>
+          </a:fillRef>
+          <a:effectRef idx="0">
+            <a:schemeClr val="accent1"/>
+          </a:effectRef>
+          <a:fontRef idx="minor">
+            <a:schemeClr val="lt1"/>
+          </a:fontRef>
+        </p:style>
+        <p:txBody>
+          <a:bodyPr rtlCol="0" anchor="ctr"/>
+          <a:lstStyle/>
+          <a:p>
+            <a:pPr algn="ctr"/>
+            <a:endParaRPr lang="en-US"/>
+          </a:p>
+        </p:txBody>
+      </p:sp>
+    </p:spTree>
+    <p:extLst>
+      <p:ext uri="{BB962C8B-B14F-4D97-AF65-F5344CB8AC3E}">
+        <p14:creationId xmlns:p14="http://schemas.microsoft.com/office/powerpoint/2010/main" val="1735489905"/>
+      </p:ext>
+    </p:extLst>
+  </p:cSld>
+  <p:clrMapOvr>
+    <a:masterClrMapping/>
+  </p:clrMapOvr>
+</p:sld>
+</file>
+
+<file path=ppt/slides/slide4.xml><?xml version="1.0" encoding="utf-8"?>
 <p:sld xmlns:a="http://schemas.openxmlformats.org/drawingml/2006/main" xmlns:r="http://schemas.openxmlformats.org/officeDocument/2006/relationships" xmlns:p="http://schemas.openxmlformats.org/presentationml/2006/main">
   <p:cSld>
     <p:bg>
@@ -7303,8 +7717,8 @@
         </p:nvSpPr>
         <p:spPr>
           <a:xfrm>
-            <a:off x="3581400" y="965580"/>
-            <a:ext cx="5204489" cy="3160593"/>
+            <a:off x="3493755" y="1641168"/>
+            <a:ext cx="5204489" cy="1704249"/>
           </a:xfrm>
         </p:spPr>
         <p:txBody>
@@ -7323,28 +7737,7 @@
                 <a:ea typeface="+mj-ea"/>
                 <a:cs typeface="+mj-cs"/>
               </a:rPr>
-              <a:t>Visualization</a:t>
-            </a:r>
-            <a:br>
-              <a:rPr lang="en-US" sz="5400" kern="1200" dirty="0">
-                <a:solidFill>
-                  <a:schemeClr val="bg1"/>
-                </a:solidFill>
-                <a:latin typeface="+mj-lt"/>
-                <a:ea typeface="+mj-ea"/>
-                <a:cs typeface="+mj-cs"/>
-              </a:rPr>
-            </a:br>
-            <a:r>
-              <a:rPr lang="en-US" sz="5400" kern="1200" dirty="0">
-                <a:solidFill>
-                  <a:schemeClr val="bg1"/>
-                </a:solidFill>
-                <a:latin typeface="+mj-lt"/>
-                <a:ea typeface="+mj-ea"/>
-                <a:cs typeface="+mj-cs"/>
-              </a:rPr>
-              <a:t>Link app: </a:t>
+              <a:t>Demo time </a:t>
             </a:r>
           </a:p>
         </p:txBody>
@@ -26101,7 +26494,7 @@
 </p:sld>
 </file>
 
-<file path=ppt/slides/slide4.xml><?xml version="1.0" encoding="utf-8"?>
+<file path=ppt/slides/slide5.xml><?xml version="1.0" encoding="utf-8"?>
 <p:sld xmlns:a="http://schemas.openxmlformats.org/drawingml/2006/main" xmlns:r="http://schemas.openxmlformats.org/officeDocument/2006/relationships" xmlns:p="http://schemas.openxmlformats.org/presentationml/2006/main">
   <p:cSld>
     <p:bg>
@@ -28248,7 +28641,7 @@
 </p:sld>
 </file>
 
-<file path=ppt/slides/slide5.xml><?xml version="1.0" encoding="utf-8"?>
+<file path=ppt/slides/slide6.xml><?xml version="1.0" encoding="utf-8"?>
 <p:sld xmlns:a="http://schemas.openxmlformats.org/drawingml/2006/main" xmlns:r="http://schemas.openxmlformats.org/officeDocument/2006/relationships" xmlns:p="http://schemas.openxmlformats.org/presentationml/2006/main">
   <p:cSld>
     <p:bg>

</xml_diff>